<commit_message>
Update SDforDeletePerson.png to SDforDeleteSource.png
</commit_message>
<xml_diff>
--- a/docs/diagrams/LogicComponentSequenceDiagram.pptx
+++ b/docs/diagrams/LogicComponentSequenceDiagram.pptx
@@ -208,7 +208,7 @@
           <a:p>
             <a:fld id="{F5CC4B3F-88C1-4FFA-B1B6-F41C21DC6924}" type="datetimeFigureOut">
               <a:rPr lang="en-US" smtClean="0"/>
-              <a:t>12/15/2018</a:t>
+              <a:t>4/15/2019</a:t>
             </a:fld>
             <a:endParaRPr lang="en-US"/>
           </a:p>
@@ -738,7 +738,7 @@
           <a:p>
             <a:fld id="{78C97017-6FC3-485B-9764-EAC9E56C1D49}" type="datetimeFigureOut">
               <a:rPr lang="en-US" smtClean="0"/>
-              <a:t>12/15/2018</a:t>
+              <a:t>4/15/2019</a:t>
             </a:fld>
             <a:endParaRPr lang="en-US"/>
           </a:p>
@@ -906,7 +906,7 @@
           <a:p>
             <a:fld id="{78C97017-6FC3-485B-9764-EAC9E56C1D49}" type="datetimeFigureOut">
               <a:rPr lang="en-US" smtClean="0"/>
-              <a:t>12/15/2018</a:t>
+              <a:t>4/15/2019</a:t>
             </a:fld>
             <a:endParaRPr lang="en-US"/>
           </a:p>
@@ -1084,7 +1084,7 @@
           <a:p>
             <a:fld id="{78C97017-6FC3-485B-9764-EAC9E56C1D49}" type="datetimeFigureOut">
               <a:rPr lang="en-US" smtClean="0"/>
-              <a:t>12/15/2018</a:t>
+              <a:t>4/15/2019</a:t>
             </a:fld>
             <a:endParaRPr lang="en-US"/>
           </a:p>
@@ -1252,7 +1252,7 @@
           <a:p>
             <a:fld id="{78C97017-6FC3-485B-9764-EAC9E56C1D49}" type="datetimeFigureOut">
               <a:rPr lang="en-US" smtClean="0"/>
-              <a:t>12/15/2018</a:t>
+              <a:t>4/15/2019</a:t>
             </a:fld>
             <a:endParaRPr lang="en-US"/>
           </a:p>
@@ -1497,7 +1497,7 @@
           <a:p>
             <a:fld id="{78C97017-6FC3-485B-9764-EAC9E56C1D49}" type="datetimeFigureOut">
               <a:rPr lang="en-US" smtClean="0"/>
-              <a:t>12/15/2018</a:t>
+              <a:t>4/15/2019</a:t>
             </a:fld>
             <a:endParaRPr lang="en-US"/>
           </a:p>
@@ -1782,7 +1782,7 @@
           <a:p>
             <a:fld id="{78C97017-6FC3-485B-9764-EAC9E56C1D49}" type="datetimeFigureOut">
               <a:rPr lang="en-US" smtClean="0"/>
-              <a:t>12/15/2018</a:t>
+              <a:t>4/15/2019</a:t>
             </a:fld>
             <a:endParaRPr lang="en-US"/>
           </a:p>
@@ -2201,7 +2201,7 @@
           <a:p>
             <a:fld id="{78C97017-6FC3-485B-9764-EAC9E56C1D49}" type="datetimeFigureOut">
               <a:rPr lang="en-US" smtClean="0"/>
-              <a:t>12/15/2018</a:t>
+              <a:t>4/15/2019</a:t>
             </a:fld>
             <a:endParaRPr lang="en-US"/>
           </a:p>
@@ -2318,7 +2318,7 @@
           <a:p>
             <a:fld id="{78C97017-6FC3-485B-9764-EAC9E56C1D49}" type="datetimeFigureOut">
               <a:rPr lang="en-US" smtClean="0"/>
-              <a:t>12/15/2018</a:t>
+              <a:t>4/15/2019</a:t>
             </a:fld>
             <a:endParaRPr lang="en-US"/>
           </a:p>
@@ -2413,7 +2413,7 @@
           <a:p>
             <a:fld id="{78C97017-6FC3-485B-9764-EAC9E56C1D49}" type="datetimeFigureOut">
               <a:rPr lang="en-US" smtClean="0"/>
-              <a:t>12/15/2018</a:t>
+              <a:t>4/15/2019</a:t>
             </a:fld>
             <a:endParaRPr lang="en-US"/>
           </a:p>
@@ -2688,7 +2688,7 @@
           <a:p>
             <a:fld id="{78C97017-6FC3-485B-9764-EAC9E56C1D49}" type="datetimeFigureOut">
               <a:rPr lang="en-US" smtClean="0"/>
-              <a:t>12/15/2018</a:t>
+              <a:t>4/15/2019</a:t>
             </a:fld>
             <a:endParaRPr lang="en-US"/>
           </a:p>
@@ -2940,7 +2940,7 @@
           <a:p>
             <a:fld id="{78C97017-6FC3-485B-9764-EAC9E56C1D49}" type="datetimeFigureOut">
               <a:rPr lang="en-US" smtClean="0"/>
-              <a:t>12/15/2018</a:t>
+              <a:t>4/15/2019</a:t>
             </a:fld>
             <a:endParaRPr lang="en-US"/>
           </a:p>
@@ -3151,7 +3151,7 @@
           <a:p>
             <a:fld id="{78C97017-6FC3-485B-9764-EAC9E56C1D49}" type="datetimeFigureOut">
               <a:rPr lang="en-US" smtClean="0"/>
-              <a:t>12/15/2018</a:t>
+              <a:t>4/15/2019</a:t>
             </a:fld>
             <a:endParaRPr lang="en-US"/>
           </a:p>
@@ -4397,7 +4397,7 @@
                   <a:srgbClr val="7030A0"/>
                 </a:solidFill>
               </a:rPr>
-              <a:t>deletePerson</a:t>
+              <a:t>deleteSource</a:t>
             </a:r>
             <a:r>
               <a:rPr lang="en-US" sz="1400" dirty="0">
@@ -4405,7 +4405,7 @@
                   <a:srgbClr val="7030A0"/>
                 </a:solidFill>
               </a:rPr>
-              <a:t>(p)</a:t>
+              <a:t>(s)</a:t>
             </a:r>
           </a:p>
         </p:txBody>
@@ -4538,7 +4538,7 @@
         </p:nvSpPr>
         <p:spPr>
           <a:xfrm>
-            <a:off x="6870618" y="2213466"/>
+            <a:off x="7162800" y="2213466"/>
             <a:ext cx="1093635" cy="346760"/>
           </a:xfrm>
           <a:prstGeom prst="rect">
@@ -4603,7 +4603,7 @@
         </p:nvCxnSpPr>
         <p:spPr>
           <a:xfrm>
-            <a:off x="7417435" y="2538761"/>
+            <a:off x="7709617" y="2538761"/>
             <a:ext cx="0" cy="2274565"/>
           </a:xfrm>
           <a:prstGeom prst="line">
@@ -4642,7 +4642,7 @@
         </p:nvSpPr>
         <p:spPr>
           <a:xfrm>
-            <a:off x="7351124" y="3879150"/>
+            <a:off x="7643306" y="3879150"/>
             <a:ext cx="124478" cy="457919"/>
           </a:xfrm>
           <a:prstGeom prst="rect">
@@ -4699,9 +4699,9 @@
           <p:nvPr/>
         </p:nvCxnSpPr>
         <p:spPr>
-          <a:xfrm flipH="1" flipV="1">
-            <a:off x="4187393" y="4336999"/>
-            <a:ext cx="3225970" cy="70"/>
+          <a:xfrm flipH="1">
+            <a:off x="4203433" y="4337069"/>
+            <a:ext cx="3502112" cy="0"/>
           </a:xfrm>
           <a:prstGeom prst="straightConnector1">
             <a:avLst/>
@@ -4740,8 +4740,8 @@
         </p:nvSpPr>
         <p:spPr>
           <a:xfrm>
-            <a:off x="4484157" y="3921005"/>
-            <a:ext cx="2466828" cy="215444"/>
+            <a:off x="4484156" y="3921005"/>
+            <a:ext cx="2933261" cy="215444"/>
           </a:xfrm>
           <a:prstGeom prst="rect">
             <a:avLst/>
@@ -4763,7 +4763,7 @@
                   </a:schemeClr>
                 </a:solidFill>
               </a:rPr>
-              <a:t>saveAddressBook</a:t>
+              <a:t>saveSourceManager</a:t>
             </a:r>
             <a:r>
               <a:rPr lang="en-US" sz="1400" dirty="0">
@@ -4783,7 +4783,7 @@
                   </a:schemeClr>
                 </a:solidFill>
               </a:rPr>
-              <a:t>AddressBook</a:t>
+              <a:t>SourceManager</a:t>
             </a:r>
             <a:r>
               <a:rPr lang="en-US" sz="1400" dirty="0">
@@ -4845,7 +4845,7 @@
         </p:nvGrpSpPr>
         <p:grpSpPr>
           <a:xfrm flipH="1">
-            <a:off x="7442978" y="3879149"/>
+            <a:off x="7735160" y="3879149"/>
             <a:ext cx="217349" cy="430885"/>
             <a:chOff x="1028134" y="5612032"/>
             <a:chExt cx="217349" cy="270072"/>
@@ -5008,7 +5008,7 @@
         </p:nvSpPr>
         <p:spPr>
           <a:xfrm>
-            <a:off x="7730090" y="3724480"/>
+            <a:off x="8022272" y="3724480"/>
             <a:ext cx="539047" cy="430887"/>
           </a:xfrm>
           <a:prstGeom prst="rect">
@@ -5065,13 +5065,14 @@
           </p:cNvPr>
           <p:cNvCxnSpPr>
             <a:cxnSpLocks/>
+            <a:endCxn id="55" idx="0"/>
           </p:cNvCxnSpPr>
           <p:nvPr/>
         </p:nvCxnSpPr>
         <p:spPr>
           <a:xfrm flipV="1">
-            <a:off x="4203433" y="3883131"/>
-            <a:ext cx="3144005" cy="1"/>
+            <a:off x="4203433" y="3879150"/>
+            <a:ext cx="3502112" cy="3984"/>
           </a:xfrm>
           <a:prstGeom prst="straightConnector1">
             <a:avLst/>

</xml_diff>